<commit_message>
fixed logic and html and css
</commit_message>
<xml_diff>
--- a/presentation.pptx
+++ b/presentation.pptx
@@ -10,12 +10,7 @@
     <p:sldId id="265" r:id="rId4"/>
     <p:sldId id="266" r:id="rId5"/>
     <p:sldId id="267" r:id="rId6"/>
-    <p:sldId id="263" r:id="rId7"/>
-    <p:sldId id="264" r:id="rId8"/>
-    <p:sldId id="258" r:id="rId9"/>
-    <p:sldId id="259" r:id="rId10"/>
-    <p:sldId id="260" r:id="rId11"/>
-    <p:sldId id="261" r:id="rId12"/>
+    <p:sldId id="268" r:id="rId7"/>
   </p:sldIdLst>
   <p:sldSz cx="9144000" cy="6858000" type="screen4x3"/>
   <p:notesSz cx="6858000" cy="9144000"/>
@@ -14716,162 +14711,140 @@
   <p:clrMapOvr>
     <a:masterClrMapping/>
   </p:clrMapOvr>
-</p:sld>
-</file>
-
-<file path=ppt/slides/slide10.xml><?xml version="1.0" encoding="utf-8"?>
-<p:sld xmlns:a="http://schemas.openxmlformats.org/drawingml/2006/main" xmlns:r="http://schemas.openxmlformats.org/officeDocument/2006/relationships" xmlns:p="http://schemas.openxmlformats.org/presentationml/2006/main">
-  <p:cSld>
-    <p:spTree>
-      <p:nvGrpSpPr>
-        <p:cNvPr id="1" name=""/>
-        <p:cNvGrpSpPr/>
-        <p:nvPr/>
-      </p:nvGrpSpPr>
-      <p:grpSpPr>
-        <a:xfrm>
-          <a:off x="0" y="0"/>
-          <a:ext cx="0" cy="0"/>
-          <a:chOff x="0" y="0"/>
-          <a:chExt cx="0" cy="0"/>
-        </a:xfrm>
-      </p:grpSpPr>
-      <p:sp>
-        <p:nvSpPr>
-          <p:cNvPr id="2" name="Title 1"/>
-          <p:cNvSpPr>
-            <a:spLocks noGrp="1"/>
-          </p:cNvSpPr>
-          <p:nvPr>
-            <p:ph type="ctrTitle"/>
-          </p:nvPr>
-        </p:nvSpPr>
-        <p:spPr>
-          <a:xfrm>
-            <a:off x="924791" y="1572490"/>
-            <a:ext cx="7294418" cy="1156855"/>
-          </a:xfrm>
-        </p:spPr>
-        <p:txBody>
-          <a:bodyPr>
-            <a:normAutofit/>
-          </a:bodyPr>
-          <a:lstStyle/>
-          <a:p>
-            <a:endParaRPr lang="en-US" sz="4800" dirty="0">
-              <a:latin typeface="Futura Medium" panose="020B0602020204020303" pitchFamily="34" charset="-79"/>
-              <a:cs typeface="Futura Medium" panose="020B0602020204020303" pitchFamily="34" charset="-79"/>
-            </a:endParaRPr>
-          </a:p>
-        </p:txBody>
-      </p:sp>
-      <p:sp>
-        <p:nvSpPr>
-          <p:cNvPr id="3" name="Subtitle 2"/>
-          <p:cNvSpPr>
-            <a:spLocks noGrp="1"/>
-          </p:cNvSpPr>
-          <p:nvPr>
-            <p:ph type="subTitle" idx="1"/>
-          </p:nvPr>
-        </p:nvSpPr>
-        <p:spPr/>
-        <p:txBody>
-          <a:bodyPr/>
-          <a:lstStyle/>
-          <a:p>
-            <a:endParaRPr lang="en-US" dirty="0"/>
-          </a:p>
-        </p:txBody>
-      </p:sp>
-    </p:spTree>
-    <p:extLst>
-      <p:ext uri="{BB962C8B-B14F-4D97-AF65-F5344CB8AC3E}">
-        <p14:creationId xmlns:p14="http://schemas.microsoft.com/office/powerpoint/2010/main" val="1086118683"/>
-      </p:ext>
-    </p:extLst>
-  </p:cSld>
-  <p:clrMapOvr>
-    <a:masterClrMapping/>
-  </p:clrMapOvr>
-</p:sld>
-</file>
-
-<file path=ppt/slides/slide11.xml><?xml version="1.0" encoding="utf-8"?>
-<p:sld xmlns:a="http://schemas.openxmlformats.org/drawingml/2006/main" xmlns:r="http://schemas.openxmlformats.org/officeDocument/2006/relationships" xmlns:p="http://schemas.openxmlformats.org/presentationml/2006/main">
-  <p:cSld>
-    <p:spTree>
-      <p:nvGrpSpPr>
-        <p:cNvPr id="1" name=""/>
-        <p:cNvGrpSpPr/>
-        <p:nvPr/>
-      </p:nvGrpSpPr>
-      <p:grpSpPr>
-        <a:xfrm>
-          <a:off x="0" y="0"/>
-          <a:ext cx="0" cy="0"/>
-          <a:chOff x="0" y="0"/>
-          <a:chExt cx="0" cy="0"/>
-        </a:xfrm>
-      </p:grpSpPr>
-      <p:sp>
-        <p:nvSpPr>
-          <p:cNvPr id="2" name="Title 1"/>
-          <p:cNvSpPr>
-            <a:spLocks noGrp="1"/>
-          </p:cNvSpPr>
-          <p:nvPr>
-            <p:ph type="ctrTitle"/>
-          </p:nvPr>
-        </p:nvSpPr>
-        <p:spPr>
-          <a:xfrm>
-            <a:off x="924791" y="1572490"/>
-            <a:ext cx="7294418" cy="1156855"/>
-          </a:xfrm>
-        </p:spPr>
-        <p:txBody>
-          <a:bodyPr>
-            <a:normAutofit/>
-          </a:bodyPr>
-          <a:lstStyle/>
-          <a:p>
-            <a:endParaRPr lang="en-US" sz="4800" dirty="0">
-              <a:latin typeface="Futura Medium" panose="020B0602020204020303" pitchFamily="34" charset="-79"/>
-              <a:cs typeface="Futura Medium" panose="020B0602020204020303" pitchFamily="34" charset="-79"/>
-            </a:endParaRPr>
-          </a:p>
-        </p:txBody>
-      </p:sp>
-      <p:sp>
-        <p:nvSpPr>
-          <p:cNvPr id="3" name="Subtitle 2"/>
-          <p:cNvSpPr>
-            <a:spLocks noGrp="1"/>
-          </p:cNvSpPr>
-          <p:nvPr>
-            <p:ph type="subTitle" idx="1"/>
-          </p:nvPr>
-        </p:nvSpPr>
-        <p:spPr/>
-        <p:txBody>
-          <a:bodyPr/>
-          <a:lstStyle/>
-          <a:p>
-            <a:endParaRPr lang="en-US" dirty="0"/>
-          </a:p>
-        </p:txBody>
-      </p:sp>
-    </p:spTree>
-    <p:extLst>
-      <p:ext uri="{BB962C8B-B14F-4D97-AF65-F5344CB8AC3E}">
-        <p14:creationId xmlns:p14="http://schemas.microsoft.com/office/powerpoint/2010/main" val="890225173"/>
-      </p:ext>
-    </p:extLst>
-  </p:cSld>
-  <p:clrMapOvr>
-    <a:masterClrMapping/>
-  </p:clrMapOvr>
+  <p:timing>
+    <p:tnLst>
+      <p:par>
+        <p:cTn id="1" dur="indefinite" restart="never" nodeType="tmRoot">
+          <p:childTnLst>
+            <p:seq concurrent="1" nextAc="seek">
+              <p:cTn id="2" dur="indefinite" nodeType="mainSeq">
+                <p:childTnLst>
+                  <p:par>
+                    <p:cTn id="3" fill="hold">
+                      <p:stCondLst>
+                        <p:cond delay="indefinite"/>
+                      </p:stCondLst>
+                      <p:childTnLst>
+                        <p:par>
+                          <p:cTn id="4" fill="hold">
+                            <p:stCondLst>
+                              <p:cond delay="0"/>
+                            </p:stCondLst>
+                            <p:childTnLst>
+                              <p:par>
+                                <p:cTn id="5" presetID="10" presetClass="entr" presetSubtype="0" fill="hold" nodeType="clickEffect">
+                                  <p:stCondLst>
+                                    <p:cond delay="0"/>
+                                  </p:stCondLst>
+                                  <p:childTnLst>
+                                    <p:set>
+                                      <p:cBhvr>
+                                        <p:cTn id="6" dur="1" fill="hold">
+                                          <p:stCondLst>
+                                            <p:cond delay="0"/>
+                                          </p:stCondLst>
+                                        </p:cTn>
+                                        <p:tgtEl>
+                                          <p:spTgt spid="3">
+                                            <p:txEl>
+                                              <p:pRg st="0" end="0"/>
+                                            </p:txEl>
+                                          </p:spTgt>
+                                        </p:tgtEl>
+                                        <p:attrNameLst>
+                                          <p:attrName>style.visibility</p:attrName>
+                                        </p:attrNameLst>
+                                      </p:cBhvr>
+                                      <p:to>
+                                        <p:strVal val="visible"/>
+                                      </p:to>
+                                    </p:set>
+                                    <p:animEffect transition="in" filter="fade">
+                                      <p:cBhvr>
+                                        <p:cTn id="7" dur="500"/>
+                                        <p:tgtEl>
+                                          <p:spTgt spid="3">
+                                            <p:txEl>
+                                              <p:pRg st="0" end="0"/>
+                                            </p:txEl>
+                                          </p:spTgt>
+                                        </p:tgtEl>
+                                      </p:cBhvr>
+                                    </p:animEffect>
+                                  </p:childTnLst>
+                                </p:cTn>
+                              </p:par>
+                              <p:par>
+                                <p:cTn id="8" presetID="10" presetClass="entr" presetSubtype="0" fill="hold" nodeType="withEffect">
+                                  <p:stCondLst>
+                                    <p:cond delay="0"/>
+                                  </p:stCondLst>
+                                  <p:childTnLst>
+                                    <p:set>
+                                      <p:cBhvr>
+                                        <p:cTn id="9" dur="1" fill="hold">
+                                          <p:stCondLst>
+                                            <p:cond delay="0"/>
+                                          </p:stCondLst>
+                                        </p:cTn>
+                                        <p:tgtEl>
+                                          <p:spTgt spid="3">
+                                            <p:txEl>
+                                              <p:pRg st="1" end="1"/>
+                                            </p:txEl>
+                                          </p:spTgt>
+                                        </p:tgtEl>
+                                        <p:attrNameLst>
+                                          <p:attrName>style.visibility</p:attrName>
+                                        </p:attrNameLst>
+                                      </p:cBhvr>
+                                      <p:to>
+                                        <p:strVal val="visible"/>
+                                      </p:to>
+                                    </p:set>
+                                    <p:animEffect transition="in" filter="fade">
+                                      <p:cBhvr>
+                                        <p:cTn id="10" dur="500"/>
+                                        <p:tgtEl>
+                                          <p:spTgt spid="3">
+                                            <p:txEl>
+                                              <p:pRg st="1" end="1"/>
+                                            </p:txEl>
+                                          </p:spTgt>
+                                        </p:tgtEl>
+                                      </p:cBhvr>
+                                    </p:animEffect>
+                                  </p:childTnLst>
+                                </p:cTn>
+                              </p:par>
+                            </p:childTnLst>
+                          </p:cTn>
+                        </p:par>
+                      </p:childTnLst>
+                    </p:cTn>
+                  </p:par>
+                </p:childTnLst>
+              </p:cTn>
+              <p:prevCondLst>
+                <p:cond evt="onPrev" delay="0">
+                  <p:tgtEl>
+                    <p:sldTgt/>
+                  </p:tgtEl>
+                </p:cond>
+              </p:prevCondLst>
+              <p:nextCondLst>
+                <p:cond evt="onNext" delay="0">
+                  <p:tgtEl>
+                    <p:sldTgt/>
+                  </p:tgtEl>
+                </p:cond>
+              </p:nextCondLst>
+            </p:seq>
+          </p:childTnLst>
+        </p:cTn>
+      </p:par>
+    </p:tnLst>
+  </p:timing>
 </p:sld>
 </file>
 
@@ -14936,7 +14909,7 @@
         </p:nvSpPr>
         <p:spPr>
           <a:xfrm>
-            <a:off x="523566" y="2517613"/>
+            <a:off x="556223" y="2248437"/>
             <a:ext cx="8089491" cy="2490839"/>
           </a:xfrm>
         </p:spPr>
@@ -14946,6 +14919,11 @@
           </a:bodyPr>
           <a:lstStyle/>
           <a:p>
+            <a:pPr>
+              <a:lnSpc>
+                <a:spcPts val="5420"/>
+              </a:lnSpc>
+            </a:pPr>
             <a:r>
               <a:rPr lang="en-US" sz="3600" dirty="0">
                 <a:latin typeface="Futura Medium" panose="020B0602020204020303" pitchFamily="34" charset="-79"/>
@@ -15002,6 +14980,100 @@
   <p:clrMapOvr>
     <a:masterClrMapping/>
   </p:clrMapOvr>
+  <p:timing>
+    <p:tnLst>
+      <p:par>
+        <p:cTn id="1" dur="indefinite" restart="never" nodeType="tmRoot">
+          <p:childTnLst>
+            <p:seq concurrent="1" nextAc="seek">
+              <p:cTn id="2" dur="indefinite" nodeType="mainSeq">
+                <p:childTnLst>
+                  <p:par>
+                    <p:cTn id="3" fill="hold">
+                      <p:stCondLst>
+                        <p:cond delay="indefinite"/>
+                      </p:stCondLst>
+                      <p:childTnLst>
+                        <p:par>
+                          <p:cTn id="4" fill="hold">
+                            <p:stCondLst>
+                              <p:cond delay="0"/>
+                            </p:stCondLst>
+                            <p:childTnLst>
+                              <p:par>
+                                <p:cTn id="5" presetID="10" presetClass="entr" presetSubtype="0" fill="hold" grpId="0" nodeType="clickEffect">
+                                  <p:stCondLst>
+                                    <p:cond delay="0"/>
+                                  </p:stCondLst>
+                                  <p:childTnLst>
+                                    <p:set>
+                                      <p:cBhvr>
+                                        <p:cTn id="6" dur="1" fill="hold">
+                                          <p:stCondLst>
+                                            <p:cond delay="0"/>
+                                          </p:stCondLst>
+                                        </p:cTn>
+                                        <p:tgtEl>
+                                          <p:spTgt spid="3">
+                                            <p:txEl>
+                                              <p:pRg st="0" end="0"/>
+                                            </p:txEl>
+                                          </p:spTgt>
+                                        </p:tgtEl>
+                                        <p:attrNameLst>
+                                          <p:attrName>style.visibility</p:attrName>
+                                        </p:attrNameLst>
+                                      </p:cBhvr>
+                                      <p:to>
+                                        <p:strVal val="visible"/>
+                                      </p:to>
+                                    </p:set>
+                                    <p:animEffect transition="in" filter="fade">
+                                      <p:cBhvr>
+                                        <p:cTn id="7" dur="500"/>
+                                        <p:tgtEl>
+                                          <p:spTgt spid="3">
+                                            <p:txEl>
+                                              <p:pRg st="0" end="0"/>
+                                            </p:txEl>
+                                          </p:spTgt>
+                                        </p:tgtEl>
+                                      </p:cBhvr>
+                                    </p:animEffect>
+                                  </p:childTnLst>
+                                </p:cTn>
+                              </p:par>
+                            </p:childTnLst>
+                          </p:cTn>
+                        </p:par>
+                      </p:childTnLst>
+                    </p:cTn>
+                  </p:par>
+                </p:childTnLst>
+              </p:cTn>
+              <p:prevCondLst>
+                <p:cond evt="onPrev" delay="0">
+                  <p:tgtEl>
+                    <p:sldTgt/>
+                  </p:tgtEl>
+                </p:cond>
+              </p:prevCondLst>
+              <p:nextCondLst>
+                <p:cond evt="onNext" delay="0">
+                  <p:tgtEl>
+                    <p:sldTgt/>
+                  </p:tgtEl>
+                </p:cond>
+              </p:nextCondLst>
+            </p:seq>
+          </p:childTnLst>
+        </p:cTn>
+      </p:par>
+    </p:tnLst>
+    <p:bldLst>
+      <p:bldP spid="3" grpId="0" build="p"/>
+    </p:bldLst>
+  </p:timing>
 </p:sld>
 </file>
 
@@ -15172,6 +15244,226 @@
   <p:clrMapOvr>
     <a:masterClrMapping/>
   </p:clrMapOvr>
+  <p:timing>
+    <p:tnLst>
+      <p:par>
+        <p:cTn id="1" dur="indefinite" restart="never" nodeType="tmRoot">
+          <p:childTnLst>
+            <p:seq concurrent="1" nextAc="seek">
+              <p:cTn id="2" dur="indefinite" nodeType="mainSeq">
+                <p:childTnLst>
+                  <p:par>
+                    <p:cTn id="3" fill="hold">
+                      <p:stCondLst>
+                        <p:cond delay="indefinite"/>
+                      </p:stCondLst>
+                      <p:childTnLst>
+                        <p:par>
+                          <p:cTn id="4" fill="hold">
+                            <p:stCondLst>
+                              <p:cond delay="0"/>
+                            </p:stCondLst>
+                            <p:childTnLst>
+                              <p:par>
+                                <p:cTn id="5" presetID="10" presetClass="entr" presetSubtype="0" fill="hold" nodeType="clickEffect">
+                                  <p:stCondLst>
+                                    <p:cond delay="0"/>
+                                  </p:stCondLst>
+                                  <p:childTnLst>
+                                    <p:set>
+                                      <p:cBhvr>
+                                        <p:cTn id="6" dur="1" fill="hold">
+                                          <p:stCondLst>
+                                            <p:cond delay="0"/>
+                                          </p:stCondLst>
+                                        </p:cTn>
+                                        <p:tgtEl>
+                                          <p:spTgt spid="3">
+                                            <p:txEl>
+                                              <p:pRg st="0" end="0"/>
+                                            </p:txEl>
+                                          </p:spTgt>
+                                        </p:tgtEl>
+                                        <p:attrNameLst>
+                                          <p:attrName>style.visibility</p:attrName>
+                                        </p:attrNameLst>
+                                      </p:cBhvr>
+                                      <p:to>
+                                        <p:strVal val="visible"/>
+                                      </p:to>
+                                    </p:set>
+                                    <p:animEffect transition="in" filter="fade">
+                                      <p:cBhvr>
+                                        <p:cTn id="7" dur="500"/>
+                                        <p:tgtEl>
+                                          <p:spTgt spid="3">
+                                            <p:txEl>
+                                              <p:pRg st="0" end="0"/>
+                                            </p:txEl>
+                                          </p:spTgt>
+                                        </p:tgtEl>
+                                      </p:cBhvr>
+                                    </p:animEffect>
+                                  </p:childTnLst>
+                                </p:cTn>
+                              </p:par>
+                              <p:par>
+                                <p:cTn id="8" presetID="10" presetClass="entr" presetSubtype="0" fill="hold" nodeType="withEffect">
+                                  <p:stCondLst>
+                                    <p:cond delay="0"/>
+                                  </p:stCondLst>
+                                  <p:childTnLst>
+                                    <p:set>
+                                      <p:cBhvr>
+                                        <p:cTn id="9" dur="1" fill="hold">
+                                          <p:stCondLst>
+                                            <p:cond delay="0"/>
+                                          </p:stCondLst>
+                                        </p:cTn>
+                                        <p:tgtEl>
+                                          <p:spTgt spid="3">
+                                            <p:txEl>
+                                              <p:pRg st="1" end="1"/>
+                                            </p:txEl>
+                                          </p:spTgt>
+                                        </p:tgtEl>
+                                        <p:attrNameLst>
+                                          <p:attrName>style.visibility</p:attrName>
+                                        </p:attrNameLst>
+                                      </p:cBhvr>
+                                      <p:to>
+                                        <p:strVal val="visible"/>
+                                      </p:to>
+                                    </p:set>
+                                    <p:animEffect transition="in" filter="fade">
+                                      <p:cBhvr>
+                                        <p:cTn id="10" dur="500"/>
+                                        <p:tgtEl>
+                                          <p:spTgt spid="3">
+                                            <p:txEl>
+                                              <p:pRg st="1" end="1"/>
+                                            </p:txEl>
+                                          </p:spTgt>
+                                        </p:tgtEl>
+                                      </p:cBhvr>
+                                    </p:animEffect>
+                                  </p:childTnLst>
+                                </p:cTn>
+                              </p:par>
+                              <p:par>
+                                <p:cTn id="11" presetID="10" presetClass="entr" presetSubtype="0" fill="hold" nodeType="withEffect">
+                                  <p:stCondLst>
+                                    <p:cond delay="0"/>
+                                  </p:stCondLst>
+                                  <p:childTnLst>
+                                    <p:set>
+                                      <p:cBhvr>
+                                        <p:cTn id="12" dur="1" fill="hold">
+                                          <p:stCondLst>
+                                            <p:cond delay="0"/>
+                                          </p:stCondLst>
+                                        </p:cTn>
+                                        <p:tgtEl>
+                                          <p:spTgt spid="3">
+                                            <p:txEl>
+                                              <p:pRg st="2" end="2"/>
+                                            </p:txEl>
+                                          </p:spTgt>
+                                        </p:tgtEl>
+                                        <p:attrNameLst>
+                                          <p:attrName>style.visibility</p:attrName>
+                                        </p:attrNameLst>
+                                      </p:cBhvr>
+                                      <p:to>
+                                        <p:strVal val="visible"/>
+                                      </p:to>
+                                    </p:set>
+                                    <p:animEffect transition="in" filter="fade">
+                                      <p:cBhvr>
+                                        <p:cTn id="13" dur="500"/>
+                                        <p:tgtEl>
+                                          <p:spTgt spid="3">
+                                            <p:txEl>
+                                              <p:pRg st="2" end="2"/>
+                                            </p:txEl>
+                                          </p:spTgt>
+                                        </p:tgtEl>
+                                      </p:cBhvr>
+                                    </p:animEffect>
+                                  </p:childTnLst>
+                                </p:cTn>
+                              </p:par>
+                              <p:par>
+                                <p:cTn id="14" presetID="10" presetClass="entr" presetSubtype="0" fill="hold" nodeType="withEffect">
+                                  <p:stCondLst>
+                                    <p:cond delay="0"/>
+                                  </p:stCondLst>
+                                  <p:childTnLst>
+                                    <p:set>
+                                      <p:cBhvr>
+                                        <p:cTn id="15" dur="1" fill="hold">
+                                          <p:stCondLst>
+                                            <p:cond delay="0"/>
+                                          </p:stCondLst>
+                                        </p:cTn>
+                                        <p:tgtEl>
+                                          <p:spTgt spid="3">
+                                            <p:txEl>
+                                              <p:pRg st="3" end="3"/>
+                                            </p:txEl>
+                                          </p:spTgt>
+                                        </p:tgtEl>
+                                        <p:attrNameLst>
+                                          <p:attrName>style.visibility</p:attrName>
+                                        </p:attrNameLst>
+                                      </p:cBhvr>
+                                      <p:to>
+                                        <p:strVal val="visible"/>
+                                      </p:to>
+                                    </p:set>
+                                    <p:animEffect transition="in" filter="fade">
+                                      <p:cBhvr>
+                                        <p:cTn id="16" dur="500"/>
+                                        <p:tgtEl>
+                                          <p:spTgt spid="3">
+                                            <p:txEl>
+                                              <p:pRg st="3" end="3"/>
+                                            </p:txEl>
+                                          </p:spTgt>
+                                        </p:tgtEl>
+                                      </p:cBhvr>
+                                    </p:animEffect>
+                                  </p:childTnLst>
+                                </p:cTn>
+                              </p:par>
+                            </p:childTnLst>
+                          </p:cTn>
+                        </p:par>
+                      </p:childTnLst>
+                    </p:cTn>
+                  </p:par>
+                </p:childTnLst>
+              </p:cTn>
+              <p:prevCondLst>
+                <p:cond evt="onPrev" delay="0">
+                  <p:tgtEl>
+                    <p:sldTgt/>
+                  </p:tgtEl>
+                </p:cond>
+              </p:prevCondLst>
+              <p:nextCondLst>
+                <p:cond evt="onNext" delay="0">
+                  <p:tgtEl>
+                    <p:sldTgt/>
+                  </p:tgtEl>
+                </p:cond>
+              </p:nextCondLst>
+            </p:seq>
+          </p:childTnLst>
+        </p:cTn>
+      </p:par>
+    </p:tnLst>
+  </p:timing>
 </p:sld>
 </file>
 
@@ -15320,12 +15612,38 @@
         </p:blipFill>
         <p:spPr>
           <a:xfrm>
-            <a:off x="5796640" y="2274251"/>
+            <a:off x="5796640" y="2401628"/>
             <a:ext cx="2839601" cy="3575957"/>
           </a:xfrm>
-          <a:prstGeom prst="rect">
-            <a:avLst/>
+          <a:prstGeom prst="roundRect">
+            <a:avLst>
+              <a:gd name="adj" fmla="val 4167"/>
+            </a:avLst>
           </a:prstGeom>
+          <a:solidFill>
+            <a:srgbClr val="FFFFFF"/>
+          </a:solidFill>
+          <a:ln w="76200" cap="sq">
+            <a:solidFill>
+              <a:srgbClr val="EAEAEA"/>
+            </a:solidFill>
+            <a:miter lim="800000"/>
+          </a:ln>
+          <a:effectLst>
+            <a:reflection blurRad="12700" stA="33000" endPos="28000" dist="5000" dir="5400000" sy="-100000" algn="bl" rotWithShape="0"/>
+          </a:effectLst>
+          <a:scene3d>
+            <a:camera prst="orthographicFront"/>
+            <a:lightRig rig="threePt" dir="t">
+              <a:rot lat="0" lon="0" rev="2700000"/>
+            </a:lightRig>
+          </a:scene3d>
+          <a:sp3d contourW="6350">
+            <a:bevelT h="38100"/>
+            <a:contourClr>
+              <a:srgbClr val="C0C0C0"/>
+            </a:contourClr>
+          </a:sp3d>
         </p:spPr>
       </p:pic>
       <p:pic>
@@ -15356,12 +15674,38 @@
         </p:blipFill>
         <p:spPr>
           <a:xfrm>
-            <a:off x="404839" y="2713736"/>
+            <a:off x="404839" y="2621371"/>
             <a:ext cx="5055805" cy="3136472"/>
           </a:xfrm>
-          <a:prstGeom prst="rect">
-            <a:avLst/>
+          <a:prstGeom prst="roundRect">
+            <a:avLst>
+              <a:gd name="adj" fmla="val 4167"/>
+            </a:avLst>
           </a:prstGeom>
+          <a:solidFill>
+            <a:srgbClr val="FFFFFF"/>
+          </a:solidFill>
+          <a:ln w="76200" cap="sq">
+            <a:solidFill>
+              <a:srgbClr val="EAEAEA"/>
+            </a:solidFill>
+            <a:miter lim="800000"/>
+          </a:ln>
+          <a:effectLst>
+            <a:reflection blurRad="12700" stA="33000" endPos="28000" dist="5000" dir="5400000" sy="-100000" algn="bl" rotWithShape="0"/>
+          </a:effectLst>
+          <a:scene3d>
+            <a:camera prst="orthographicFront"/>
+            <a:lightRig rig="threePt" dir="t">
+              <a:rot lat="0" lon="0" rev="2700000"/>
+            </a:lightRig>
+          </a:scene3d>
+          <a:sp3d contourW="6350">
+            <a:bevelT h="38100"/>
+            <a:contourClr>
+              <a:srgbClr val="C0C0C0"/>
+            </a:contourClr>
+          </a:sp3d>
         </p:spPr>
       </p:pic>
       <p:sp>
@@ -15414,6 +15758,124 @@
   <p:clrMapOvr>
     <a:masterClrMapping/>
   </p:clrMapOvr>
+  <p:timing>
+    <p:tnLst>
+      <p:par>
+        <p:cTn id="1" dur="indefinite" restart="never" nodeType="tmRoot">
+          <p:childTnLst>
+            <p:seq concurrent="1" nextAc="seek">
+              <p:cTn id="2" dur="indefinite" nodeType="mainSeq">
+                <p:childTnLst>
+                  <p:par>
+                    <p:cTn id="3" fill="hold">
+                      <p:stCondLst>
+                        <p:cond delay="indefinite"/>
+                      </p:stCondLst>
+                      <p:childTnLst>
+                        <p:par>
+                          <p:cTn id="4" fill="hold">
+                            <p:stCondLst>
+                              <p:cond delay="0"/>
+                            </p:stCondLst>
+                            <p:childTnLst>
+                              <p:par>
+                                <p:cTn id="5" presetID="26" presetClass="emph" presetSubtype="0" fill="hold" nodeType="clickEffect">
+                                  <p:stCondLst>
+                                    <p:cond delay="0"/>
+                                  </p:stCondLst>
+                                  <p:childTnLst>
+                                    <p:animEffect transition="out" filter="fade">
+                                      <p:cBhvr>
+                                        <p:cTn id="6" dur="500" tmFilter="0, 0; .2, .5; .8, .5; 1, 0"/>
+                                        <p:tgtEl>
+                                          <p:spTgt spid="11"/>
+                                        </p:tgtEl>
+                                      </p:cBhvr>
+                                    </p:animEffect>
+                                    <p:animScale>
+                                      <p:cBhvr>
+                                        <p:cTn id="7" dur="250" autoRev="1" fill="hold"/>
+                                        <p:tgtEl>
+                                          <p:spTgt spid="11"/>
+                                        </p:tgtEl>
+                                      </p:cBhvr>
+                                      <p:by x="105000" y="105000"/>
+                                    </p:animScale>
+                                  </p:childTnLst>
+                                </p:cTn>
+                              </p:par>
+                            </p:childTnLst>
+                          </p:cTn>
+                        </p:par>
+                      </p:childTnLst>
+                    </p:cTn>
+                  </p:par>
+                  <p:par>
+                    <p:cTn id="8" fill="hold">
+                      <p:stCondLst>
+                        <p:cond delay="indefinite"/>
+                      </p:stCondLst>
+                      <p:childTnLst>
+                        <p:par>
+                          <p:cTn id="9" fill="hold">
+                            <p:stCondLst>
+                              <p:cond delay="0"/>
+                            </p:stCondLst>
+                            <p:childTnLst>
+                              <p:par>
+                                <p:cTn id="10" presetID="26" presetClass="emph" presetSubtype="0" fill="hold" nodeType="clickEffect">
+                                  <p:stCondLst>
+                                    <p:cond delay="0"/>
+                                  </p:stCondLst>
+                                  <p:childTnLst>
+                                    <p:animEffect transition="out" filter="fade">
+                                      <p:cBhvr>
+                                        <p:cTn id="11" dur="500" tmFilter="0, 0; .2, .5; .8, .5; 1, 0"/>
+                                        <p:tgtEl>
+                                          <p:spTgt spid="8"/>
+                                        </p:tgtEl>
+                                      </p:cBhvr>
+                                    </p:animEffect>
+                                    <p:animScale>
+                                      <p:cBhvr>
+                                        <p:cTn id="12" dur="250" autoRev="1" fill="hold"/>
+                                        <p:tgtEl>
+                                          <p:spTgt spid="8"/>
+                                        </p:tgtEl>
+                                      </p:cBhvr>
+                                      <p:by x="105000" y="105000"/>
+                                    </p:animScale>
+                                  </p:childTnLst>
+                                </p:cTn>
+                              </p:par>
+                            </p:childTnLst>
+                          </p:cTn>
+                        </p:par>
+                      </p:childTnLst>
+                    </p:cTn>
+                  </p:par>
+                </p:childTnLst>
+              </p:cTn>
+              <p:prevCondLst>
+                <p:cond evt="onPrev" delay="0">
+                  <p:tgtEl>
+                    <p:sldTgt/>
+                  </p:tgtEl>
+                </p:cond>
+              </p:prevCondLst>
+              <p:nextCondLst>
+                <p:cond evt="onNext" delay="0">
+                  <p:tgtEl>
+                    <p:sldTgt/>
+                  </p:tgtEl>
+                </p:cond>
+              </p:nextCondLst>
+            </p:seq>
+          </p:childTnLst>
+        </p:cTn>
+      </p:par>
+    </p:tnLst>
+  </p:timing>
 </p:sld>
 </file>
 
@@ -15478,7 +15940,7 @@
         </p:nvSpPr>
         <p:spPr>
           <a:xfrm>
-            <a:off x="519352" y="2295044"/>
+            <a:off x="535680" y="2434717"/>
             <a:ext cx="8089491" cy="2490839"/>
           </a:xfrm>
         </p:spPr>
@@ -15489,20 +15951,95 @@
           <a:lstStyle/>
           <a:p>
             <a:pPr marL="571500" indent="-571500">
+              <a:lnSpc>
+                <a:spcPts val="4640"/>
+              </a:lnSpc>
               <a:buClr>
-                <a:schemeClr val="bg2"/>
+                <a:schemeClr val="bg1">
+                  <a:lumMod val="95000"/>
+                </a:schemeClr>
               </a:buClr>
               <a:buFont typeface="Arial" panose="020B0604020202020204" pitchFamily="34" charset="0"/>
               <a:buChar char="•"/>
             </a:pPr>
             <a:r>
-              <a:rPr lang="en-US" sz="3600" dirty="0" err="1">
+              <a:rPr lang="en-US" sz="3200" dirty="0">
+                <a:latin typeface="Futura Medium" panose="020B0602020204020303" pitchFamily="34" charset="-79"/>
+                <a:cs typeface="Futura Medium" panose="020B0602020204020303" pitchFamily="34" charset="-79"/>
+              </a:rPr>
+              <a:t>HTML, Bootstrap and CSS: front-end</a:t>
+            </a:r>
+          </a:p>
+          <a:p>
+            <a:pPr marL="571500" indent="-571500">
+              <a:lnSpc>
+                <a:spcPts val="4640"/>
+              </a:lnSpc>
+              <a:buClr>
+                <a:schemeClr val="bg1">
+                  <a:lumMod val="95000"/>
+                </a:schemeClr>
+              </a:buClr>
+              <a:buFont typeface="Arial" panose="020B0604020202020204" pitchFamily="34" charset="0"/>
+              <a:buChar char="•"/>
+            </a:pPr>
+            <a:r>
+              <a:rPr lang="en-US" sz="3200" dirty="0">
+                <a:latin typeface="Futura Medium" panose="020B0602020204020303" pitchFamily="34" charset="-79"/>
+                <a:cs typeface="Futura Medium" panose="020B0602020204020303" pitchFamily="34" charset="-79"/>
+              </a:rPr>
+              <a:t>jQuery: logic</a:t>
+            </a:r>
+          </a:p>
+          <a:p>
+            <a:pPr marL="571500" indent="-571500">
+              <a:lnSpc>
+                <a:spcPts val="4640"/>
+              </a:lnSpc>
+              <a:buClr>
+                <a:schemeClr val="bg1">
+                  <a:lumMod val="95000"/>
+                </a:schemeClr>
+              </a:buClr>
+              <a:buFont typeface="Arial" panose="020B0604020202020204" pitchFamily="34" charset="0"/>
+              <a:buChar char="•"/>
+            </a:pPr>
+            <a:r>
+              <a:rPr lang="en-US" sz="3200" dirty="0">
+                <a:latin typeface="Futura Medium" panose="020B0602020204020303" pitchFamily="34" charset="-79"/>
+                <a:cs typeface="Futura Medium" panose="020B0602020204020303" pitchFamily="34" charset="-79"/>
+              </a:rPr>
+              <a:t>Firebase: database</a:t>
+            </a:r>
+          </a:p>
+          <a:p>
+            <a:pPr marL="571500" indent="-571500">
+              <a:lnSpc>
+                <a:spcPts val="4640"/>
+              </a:lnSpc>
+              <a:buClr>
+                <a:schemeClr val="bg1">
+                  <a:lumMod val="95000"/>
+                </a:schemeClr>
+              </a:buClr>
+              <a:buFont typeface="Arial" panose="020B0604020202020204" pitchFamily="34" charset="0"/>
+              <a:buChar char="•"/>
+            </a:pPr>
+            <a:r>
+              <a:rPr lang="en-US" sz="3200" dirty="0" err="1">
                 <a:latin typeface="Futura Medium" panose="020B0602020204020303" pitchFamily="34" charset="-79"/>
                 <a:cs typeface="Futura Medium" panose="020B0602020204020303" pitchFamily="34" charset="-79"/>
               </a:rPr>
               <a:t>Algoria</a:t>
             </a:r>
-            <a:endParaRPr lang="en-US" sz="3600" dirty="0">
+            <a:r>
+              <a:rPr lang="en-US" sz="3200" dirty="0">
+                <a:latin typeface="Futura Medium" panose="020B0602020204020303" pitchFamily="34" charset="-79"/>
+                <a:cs typeface="Futura Medium" panose="020B0602020204020303" pitchFamily="34" charset="-79"/>
+              </a:rPr>
+              <a:t>: new technology</a:t>
+            </a:r>
+            <a:endParaRPr lang="en-US" sz="3200" b="1" dirty="0">
               <a:latin typeface="Futura Medium" panose="020B0602020204020303" pitchFamily="34" charset="-79"/>
               <a:cs typeface="Futura Medium" panose="020B0602020204020303" pitchFamily="34" charset="-79"/>
             </a:endParaRPr>
@@ -15515,45 +16052,10 @@
               <a:buFont typeface="Arial" panose="020B0604020202020204" pitchFamily="34" charset="0"/>
               <a:buChar char="•"/>
             </a:pPr>
-            <a:r>
-              <a:rPr lang="en-US" sz="3600" dirty="0">
-                <a:latin typeface="Futura Medium" panose="020B0602020204020303" pitchFamily="34" charset="-79"/>
-                <a:cs typeface="Futura Medium" panose="020B0602020204020303" pitchFamily="34" charset="-79"/>
-              </a:rPr>
-              <a:t>jQuery</a:t>
-            </a:r>
-          </a:p>
-          <a:p>
-            <a:pPr marL="571500" indent="-571500">
-              <a:buClr>
-                <a:schemeClr val="bg2"/>
-              </a:buClr>
-              <a:buFont typeface="Arial" panose="020B0604020202020204" pitchFamily="34" charset="0"/>
-              <a:buChar char="•"/>
-            </a:pPr>
-            <a:r>
-              <a:rPr lang="en-US" sz="3600" dirty="0">
-                <a:latin typeface="Futura Medium" panose="020B0602020204020303" pitchFamily="34" charset="-79"/>
-                <a:cs typeface="Futura Medium" panose="020B0602020204020303" pitchFamily="34" charset="-79"/>
-              </a:rPr>
-              <a:t>Firebase</a:t>
-            </a:r>
-          </a:p>
-          <a:p>
-            <a:pPr marL="571500" indent="-571500">
-              <a:buClr>
-                <a:schemeClr val="bg2"/>
-              </a:buClr>
-              <a:buFont typeface="Arial" panose="020B0604020202020204" pitchFamily="34" charset="0"/>
-              <a:buChar char="•"/>
-            </a:pPr>
-            <a:r>
-              <a:rPr lang="en-US" sz="3600" dirty="0">
-                <a:latin typeface="Futura Medium" panose="020B0602020204020303" pitchFamily="34" charset="-79"/>
-                <a:cs typeface="Futura Medium" panose="020B0602020204020303" pitchFamily="34" charset="-79"/>
-              </a:rPr>
-              <a:t>HTML, Bootstrap and CSS</a:t>
-            </a:r>
+            <a:endParaRPr lang="en-US" sz="3600" dirty="0">
+              <a:latin typeface="Futura Medium" panose="020B0602020204020303" pitchFamily="34" charset="-79"/>
+              <a:cs typeface="Futura Medium" panose="020B0602020204020303" pitchFamily="34" charset="-79"/>
+            </a:endParaRPr>
           </a:p>
           <a:p>
             <a:pPr marL="571500" indent="-571500">
@@ -15616,6 +16118,226 @@
   <p:clrMapOvr>
     <a:masterClrMapping/>
   </p:clrMapOvr>
+  <p:timing>
+    <p:tnLst>
+      <p:par>
+        <p:cTn id="1" dur="indefinite" restart="never" nodeType="tmRoot">
+          <p:childTnLst>
+            <p:seq concurrent="1" nextAc="seek">
+              <p:cTn id="2" dur="indefinite" nodeType="mainSeq">
+                <p:childTnLst>
+                  <p:par>
+                    <p:cTn id="3" fill="hold">
+                      <p:stCondLst>
+                        <p:cond delay="indefinite"/>
+                      </p:stCondLst>
+                      <p:childTnLst>
+                        <p:par>
+                          <p:cTn id="4" fill="hold">
+                            <p:stCondLst>
+                              <p:cond delay="0"/>
+                            </p:stCondLst>
+                            <p:childTnLst>
+                              <p:par>
+                                <p:cTn id="5" presetID="10" presetClass="entr" presetSubtype="0" fill="hold" nodeType="clickEffect">
+                                  <p:stCondLst>
+                                    <p:cond delay="0"/>
+                                  </p:stCondLst>
+                                  <p:childTnLst>
+                                    <p:set>
+                                      <p:cBhvr>
+                                        <p:cTn id="6" dur="1" fill="hold">
+                                          <p:stCondLst>
+                                            <p:cond delay="0"/>
+                                          </p:stCondLst>
+                                        </p:cTn>
+                                        <p:tgtEl>
+                                          <p:spTgt spid="3">
+                                            <p:txEl>
+                                              <p:pRg st="0" end="0"/>
+                                            </p:txEl>
+                                          </p:spTgt>
+                                        </p:tgtEl>
+                                        <p:attrNameLst>
+                                          <p:attrName>style.visibility</p:attrName>
+                                        </p:attrNameLst>
+                                      </p:cBhvr>
+                                      <p:to>
+                                        <p:strVal val="visible"/>
+                                      </p:to>
+                                    </p:set>
+                                    <p:animEffect transition="in" filter="fade">
+                                      <p:cBhvr>
+                                        <p:cTn id="7" dur="500"/>
+                                        <p:tgtEl>
+                                          <p:spTgt spid="3">
+                                            <p:txEl>
+                                              <p:pRg st="0" end="0"/>
+                                            </p:txEl>
+                                          </p:spTgt>
+                                        </p:tgtEl>
+                                      </p:cBhvr>
+                                    </p:animEffect>
+                                  </p:childTnLst>
+                                </p:cTn>
+                              </p:par>
+                              <p:par>
+                                <p:cTn id="8" presetID="10" presetClass="entr" presetSubtype="0" fill="hold" nodeType="withEffect">
+                                  <p:stCondLst>
+                                    <p:cond delay="0"/>
+                                  </p:stCondLst>
+                                  <p:childTnLst>
+                                    <p:set>
+                                      <p:cBhvr>
+                                        <p:cTn id="9" dur="1" fill="hold">
+                                          <p:stCondLst>
+                                            <p:cond delay="0"/>
+                                          </p:stCondLst>
+                                        </p:cTn>
+                                        <p:tgtEl>
+                                          <p:spTgt spid="3">
+                                            <p:txEl>
+                                              <p:pRg st="1" end="1"/>
+                                            </p:txEl>
+                                          </p:spTgt>
+                                        </p:tgtEl>
+                                        <p:attrNameLst>
+                                          <p:attrName>style.visibility</p:attrName>
+                                        </p:attrNameLst>
+                                      </p:cBhvr>
+                                      <p:to>
+                                        <p:strVal val="visible"/>
+                                      </p:to>
+                                    </p:set>
+                                    <p:animEffect transition="in" filter="fade">
+                                      <p:cBhvr>
+                                        <p:cTn id="10" dur="500"/>
+                                        <p:tgtEl>
+                                          <p:spTgt spid="3">
+                                            <p:txEl>
+                                              <p:pRg st="1" end="1"/>
+                                            </p:txEl>
+                                          </p:spTgt>
+                                        </p:tgtEl>
+                                      </p:cBhvr>
+                                    </p:animEffect>
+                                  </p:childTnLst>
+                                </p:cTn>
+                              </p:par>
+                              <p:par>
+                                <p:cTn id="11" presetID="10" presetClass="entr" presetSubtype="0" fill="hold" nodeType="withEffect">
+                                  <p:stCondLst>
+                                    <p:cond delay="0"/>
+                                  </p:stCondLst>
+                                  <p:childTnLst>
+                                    <p:set>
+                                      <p:cBhvr>
+                                        <p:cTn id="12" dur="1" fill="hold">
+                                          <p:stCondLst>
+                                            <p:cond delay="0"/>
+                                          </p:stCondLst>
+                                        </p:cTn>
+                                        <p:tgtEl>
+                                          <p:spTgt spid="3">
+                                            <p:txEl>
+                                              <p:pRg st="2" end="2"/>
+                                            </p:txEl>
+                                          </p:spTgt>
+                                        </p:tgtEl>
+                                        <p:attrNameLst>
+                                          <p:attrName>style.visibility</p:attrName>
+                                        </p:attrNameLst>
+                                      </p:cBhvr>
+                                      <p:to>
+                                        <p:strVal val="visible"/>
+                                      </p:to>
+                                    </p:set>
+                                    <p:animEffect transition="in" filter="fade">
+                                      <p:cBhvr>
+                                        <p:cTn id="13" dur="500"/>
+                                        <p:tgtEl>
+                                          <p:spTgt spid="3">
+                                            <p:txEl>
+                                              <p:pRg st="2" end="2"/>
+                                            </p:txEl>
+                                          </p:spTgt>
+                                        </p:tgtEl>
+                                      </p:cBhvr>
+                                    </p:animEffect>
+                                  </p:childTnLst>
+                                </p:cTn>
+                              </p:par>
+                              <p:par>
+                                <p:cTn id="14" presetID="10" presetClass="entr" presetSubtype="0" fill="hold" nodeType="withEffect">
+                                  <p:stCondLst>
+                                    <p:cond delay="0"/>
+                                  </p:stCondLst>
+                                  <p:childTnLst>
+                                    <p:set>
+                                      <p:cBhvr>
+                                        <p:cTn id="15" dur="1" fill="hold">
+                                          <p:stCondLst>
+                                            <p:cond delay="0"/>
+                                          </p:stCondLst>
+                                        </p:cTn>
+                                        <p:tgtEl>
+                                          <p:spTgt spid="3">
+                                            <p:txEl>
+                                              <p:pRg st="3" end="3"/>
+                                            </p:txEl>
+                                          </p:spTgt>
+                                        </p:tgtEl>
+                                        <p:attrNameLst>
+                                          <p:attrName>style.visibility</p:attrName>
+                                        </p:attrNameLst>
+                                      </p:cBhvr>
+                                      <p:to>
+                                        <p:strVal val="visible"/>
+                                      </p:to>
+                                    </p:set>
+                                    <p:animEffect transition="in" filter="fade">
+                                      <p:cBhvr>
+                                        <p:cTn id="16" dur="500"/>
+                                        <p:tgtEl>
+                                          <p:spTgt spid="3">
+                                            <p:txEl>
+                                              <p:pRg st="3" end="3"/>
+                                            </p:txEl>
+                                          </p:spTgt>
+                                        </p:tgtEl>
+                                      </p:cBhvr>
+                                    </p:animEffect>
+                                  </p:childTnLst>
+                                </p:cTn>
+                              </p:par>
+                            </p:childTnLst>
+                          </p:cTn>
+                        </p:par>
+                      </p:childTnLst>
+                    </p:cTn>
+                  </p:par>
+                </p:childTnLst>
+              </p:cTn>
+              <p:prevCondLst>
+                <p:cond evt="onPrev" delay="0">
+                  <p:tgtEl>
+                    <p:sldTgt/>
+                  </p:tgtEl>
+                </p:cond>
+              </p:prevCondLst>
+              <p:nextCondLst>
+                <p:cond evt="onNext" delay="0">
+                  <p:tgtEl>
+                    <p:sldTgt/>
+                  </p:tgtEl>
+                </p:cond>
+              </p:nextCondLst>
+            </p:seq>
+          </p:childTnLst>
+        </p:cTn>
+      </p:par>
+    </p:tnLst>
+  </p:timing>
 </p:sld>
 </file>
 
@@ -15648,20 +16370,23 @@
         </p:nvSpPr>
         <p:spPr>
           <a:xfrm>
-            <a:off x="924791" y="1572490"/>
-            <a:ext cx="7294418" cy="1156855"/>
+            <a:off x="1845129" y="793330"/>
+            <a:ext cx="6665742" cy="835660"/>
           </a:xfrm>
         </p:spPr>
         <p:txBody>
           <a:bodyPr>
-            <a:normAutofit/>
+            <a:noAutofit/>
           </a:bodyPr>
           <a:lstStyle/>
           <a:p>
-            <a:endParaRPr lang="en-US" sz="4800" dirty="0">
-              <a:latin typeface="Futura Medium" panose="020B0602020204020303" pitchFamily="34" charset="-79"/>
-              <a:cs typeface="Futura Medium" panose="020B0602020204020303" pitchFamily="34" charset="-79"/>
-            </a:endParaRPr>
+            <a:r>
+              <a:rPr lang="en-US" sz="4000" dirty="0">
+                <a:latin typeface="Futura Medium" panose="020B0602020204020303" pitchFamily="34" charset="-79"/>
+                <a:cs typeface="Futura Medium" panose="020B0602020204020303" pitchFamily="34" charset="-79"/>
+              </a:rPr>
+              <a:t>FUTURE DEVELOPMENTS</a:t>
+            </a:r>
           </a:p>
         </p:txBody>
       </p:sp>
@@ -15675,259 +16400,369 @@
             <p:ph type="subTitle" idx="1"/>
           </p:nvPr>
         </p:nvSpPr>
-        <p:spPr/>
+        <p:spPr>
+          <a:xfrm>
+            <a:off x="287634" y="2064511"/>
+            <a:ext cx="8490857" cy="3617832"/>
+          </a:xfrm>
+        </p:spPr>
         <p:txBody>
-          <a:bodyPr/>
+          <a:bodyPr>
+            <a:noAutofit/>
+          </a:bodyPr>
           <a:lstStyle/>
           <a:p>
-            <a:endParaRPr lang="en-US" dirty="0"/>
+            <a:pPr marL="571500" indent="-571500">
+              <a:lnSpc>
+                <a:spcPts val="4640"/>
+              </a:lnSpc>
+              <a:buClr>
+                <a:schemeClr val="bg1">
+                  <a:lumMod val="95000"/>
+                </a:schemeClr>
+              </a:buClr>
+              <a:buFont typeface="Arial" panose="020B0604020202020204" pitchFamily="34" charset="0"/>
+              <a:buChar char="•"/>
+            </a:pPr>
+            <a:r>
+              <a:rPr lang="en-US" sz="2800" dirty="0">
+                <a:latin typeface="Futura Medium" panose="020B0602020204020303" pitchFamily="34" charset="-79"/>
+                <a:cs typeface="Futura Medium" panose="020B0602020204020303" pitchFamily="34" charset="-79"/>
+              </a:rPr>
+              <a:t>Using parking API to find a parking spot</a:t>
+            </a:r>
+          </a:p>
+          <a:p>
+            <a:pPr marL="571500" indent="-571500">
+              <a:lnSpc>
+                <a:spcPts val="4640"/>
+              </a:lnSpc>
+              <a:buClr>
+                <a:schemeClr val="bg1">
+                  <a:lumMod val="95000"/>
+                </a:schemeClr>
+              </a:buClr>
+              <a:buFont typeface="Arial" panose="020B0604020202020204" pitchFamily="34" charset="0"/>
+              <a:buChar char="•"/>
+            </a:pPr>
+            <a:r>
+              <a:rPr lang="en-US" sz="2800" dirty="0">
+                <a:latin typeface="Futura Medium" panose="020B0602020204020303" pitchFamily="34" charset="-79"/>
+                <a:cs typeface="Futura Medium" panose="020B0602020204020303" pitchFamily="34" charset="-79"/>
+              </a:rPr>
+              <a:t>Integrating the application with Google Maps</a:t>
+            </a:r>
+          </a:p>
+          <a:p>
+            <a:pPr marL="571500" indent="-571500">
+              <a:lnSpc>
+                <a:spcPts val="4640"/>
+              </a:lnSpc>
+              <a:buClr>
+                <a:schemeClr val="bg1">
+                  <a:lumMod val="95000"/>
+                </a:schemeClr>
+              </a:buClr>
+              <a:buFont typeface="Arial" panose="020B0604020202020204" pitchFamily="34" charset="0"/>
+              <a:buChar char="•"/>
+            </a:pPr>
+            <a:r>
+              <a:rPr lang="en-US" sz="2800" dirty="0">
+                <a:latin typeface="Futura Medium" panose="020B0602020204020303" pitchFamily="34" charset="-79"/>
+                <a:cs typeface="Futura Medium" panose="020B0602020204020303" pitchFamily="34" charset="-79"/>
+              </a:rPr>
+              <a:t>Street view so users can scope out the venue</a:t>
+            </a:r>
+          </a:p>
+          <a:p>
+            <a:pPr marL="571500" indent="-571500">
+              <a:lnSpc>
+                <a:spcPts val="4640"/>
+              </a:lnSpc>
+              <a:buClr>
+                <a:schemeClr val="bg1">
+                  <a:lumMod val="95000"/>
+                </a:schemeClr>
+              </a:buClr>
+              <a:buFont typeface="Arial" panose="020B0604020202020204" pitchFamily="34" charset="0"/>
+              <a:buChar char="•"/>
+            </a:pPr>
+            <a:r>
+              <a:rPr lang="en-US" sz="2800" dirty="0">
+                <a:latin typeface="Futura Medium" panose="020B0602020204020303" pitchFamily="34" charset="-79"/>
+                <a:cs typeface="Futura Medium" panose="020B0602020204020303" pitchFamily="34" charset="-79"/>
+              </a:rPr>
+              <a:t>Adding filters to search bar (distance from event, type of event, etc.)</a:t>
+            </a:r>
           </a:p>
         </p:txBody>
       </p:sp>
+      <p:pic>
+        <p:nvPicPr>
+          <p:cNvPr id="4" name="Picture 3">
+            <a:extLst>
+              <a:ext uri="{FF2B5EF4-FFF2-40B4-BE49-F238E27FC236}">
+                <a16:creationId xmlns:a16="http://schemas.microsoft.com/office/drawing/2014/main" id="{6E8DFB48-25CE-634A-8FDD-2D02CA35A745}"/>
+              </a:ext>
+            </a:extLst>
+          </p:cNvPr>
+          <p:cNvPicPr>
+            <a:picLocks noChangeAspect="1"/>
+          </p:cNvPicPr>
+          <p:nvPr/>
+        </p:nvPicPr>
+        <p:blipFill>
+          <a:blip r:embed="rId2">
+            <a:extLst>
+              <a:ext uri="{28A0092B-C50C-407E-A947-70E740481C1C}">
+                <a14:useLocalDpi xmlns:a14="http://schemas.microsoft.com/office/drawing/2010/main" val="0"/>
+              </a:ext>
+            </a:extLst>
+          </a:blip>
+          <a:stretch>
+            <a:fillRect/>
+          </a:stretch>
+        </p:blipFill>
+        <p:spPr>
+          <a:xfrm>
+            <a:off x="535680" y="628111"/>
+            <a:ext cx="1436400" cy="1436400"/>
+          </a:xfrm>
+          <a:prstGeom prst="rect">
+            <a:avLst/>
+          </a:prstGeom>
+        </p:spPr>
+      </p:pic>
     </p:spTree>
     <p:extLst>
       <p:ext uri="{BB962C8B-B14F-4D97-AF65-F5344CB8AC3E}">
-        <p14:creationId xmlns:p14="http://schemas.microsoft.com/office/powerpoint/2010/main" val="4287648928"/>
+        <p14:creationId xmlns:p14="http://schemas.microsoft.com/office/powerpoint/2010/main" val="729901873"/>
       </p:ext>
     </p:extLst>
   </p:cSld>
   <p:clrMapOvr>
     <a:masterClrMapping/>
   </p:clrMapOvr>
-</p:sld>
-</file>
-
-<file path=ppt/slides/slide7.xml><?xml version="1.0" encoding="utf-8"?>
-<p:sld xmlns:a="http://schemas.openxmlformats.org/drawingml/2006/main" xmlns:r="http://schemas.openxmlformats.org/officeDocument/2006/relationships" xmlns:p="http://schemas.openxmlformats.org/presentationml/2006/main">
-  <p:cSld>
-    <p:spTree>
-      <p:nvGrpSpPr>
-        <p:cNvPr id="1" name=""/>
-        <p:cNvGrpSpPr/>
-        <p:nvPr/>
-      </p:nvGrpSpPr>
-      <p:grpSpPr>
-        <a:xfrm>
-          <a:off x="0" y="0"/>
-          <a:ext cx="0" cy="0"/>
-          <a:chOff x="0" y="0"/>
-          <a:chExt cx="0" cy="0"/>
-        </a:xfrm>
-      </p:grpSpPr>
-      <p:sp>
-        <p:nvSpPr>
-          <p:cNvPr id="2" name="Title 1"/>
-          <p:cNvSpPr>
-            <a:spLocks noGrp="1"/>
-          </p:cNvSpPr>
-          <p:nvPr>
-            <p:ph type="ctrTitle"/>
-          </p:nvPr>
-        </p:nvSpPr>
-        <p:spPr>
-          <a:xfrm>
-            <a:off x="924791" y="1572490"/>
-            <a:ext cx="7294418" cy="1156855"/>
-          </a:xfrm>
-        </p:spPr>
-        <p:txBody>
-          <a:bodyPr>
-            <a:normAutofit/>
-          </a:bodyPr>
-          <a:lstStyle/>
-          <a:p>
-            <a:endParaRPr lang="en-US" sz="4800" dirty="0">
-              <a:latin typeface="Futura Medium" panose="020B0602020204020303" pitchFamily="34" charset="-79"/>
-              <a:cs typeface="Futura Medium" panose="020B0602020204020303" pitchFamily="34" charset="-79"/>
-            </a:endParaRPr>
-          </a:p>
-        </p:txBody>
-      </p:sp>
-      <p:sp>
-        <p:nvSpPr>
-          <p:cNvPr id="3" name="Subtitle 2"/>
-          <p:cNvSpPr>
-            <a:spLocks noGrp="1"/>
-          </p:cNvSpPr>
-          <p:nvPr>
-            <p:ph type="subTitle" idx="1"/>
-          </p:nvPr>
-        </p:nvSpPr>
-        <p:spPr/>
-        <p:txBody>
-          <a:bodyPr/>
-          <a:lstStyle/>
-          <a:p>
-            <a:endParaRPr lang="en-US" dirty="0"/>
-          </a:p>
-        </p:txBody>
-      </p:sp>
-    </p:spTree>
-    <p:extLst>
-      <p:ext uri="{BB962C8B-B14F-4D97-AF65-F5344CB8AC3E}">
-        <p14:creationId xmlns:p14="http://schemas.microsoft.com/office/powerpoint/2010/main" val="3154073317"/>
-      </p:ext>
-    </p:extLst>
-  </p:cSld>
-  <p:clrMapOvr>
-    <a:masterClrMapping/>
-  </p:clrMapOvr>
-</p:sld>
-</file>
-
-<file path=ppt/slides/slide8.xml><?xml version="1.0" encoding="utf-8"?>
-<p:sld xmlns:a="http://schemas.openxmlformats.org/drawingml/2006/main" xmlns:r="http://schemas.openxmlformats.org/officeDocument/2006/relationships" xmlns:p="http://schemas.openxmlformats.org/presentationml/2006/main">
-  <p:cSld>
-    <p:spTree>
-      <p:nvGrpSpPr>
-        <p:cNvPr id="1" name=""/>
-        <p:cNvGrpSpPr/>
-        <p:nvPr/>
-      </p:nvGrpSpPr>
-      <p:grpSpPr>
-        <a:xfrm>
-          <a:off x="0" y="0"/>
-          <a:ext cx="0" cy="0"/>
-          <a:chOff x="0" y="0"/>
-          <a:chExt cx="0" cy="0"/>
-        </a:xfrm>
-      </p:grpSpPr>
-      <p:sp>
-        <p:nvSpPr>
-          <p:cNvPr id="2" name="Title 1"/>
-          <p:cNvSpPr>
-            <a:spLocks noGrp="1"/>
-          </p:cNvSpPr>
-          <p:nvPr>
-            <p:ph type="ctrTitle"/>
-          </p:nvPr>
-        </p:nvSpPr>
-        <p:spPr>
-          <a:xfrm>
-            <a:off x="924791" y="1572490"/>
-            <a:ext cx="7294418" cy="1156855"/>
-          </a:xfrm>
-        </p:spPr>
-        <p:txBody>
-          <a:bodyPr>
-            <a:normAutofit/>
-          </a:bodyPr>
-          <a:lstStyle/>
-          <a:p>
-            <a:endParaRPr lang="en-US" sz="4800" dirty="0">
-              <a:latin typeface="Futura Medium" panose="020B0602020204020303" pitchFamily="34" charset="-79"/>
-              <a:cs typeface="Futura Medium" panose="020B0602020204020303" pitchFamily="34" charset="-79"/>
-            </a:endParaRPr>
-          </a:p>
-        </p:txBody>
-      </p:sp>
-      <p:sp>
-        <p:nvSpPr>
-          <p:cNvPr id="3" name="Subtitle 2"/>
-          <p:cNvSpPr>
-            <a:spLocks noGrp="1"/>
-          </p:cNvSpPr>
-          <p:nvPr>
-            <p:ph type="subTitle" idx="1"/>
-          </p:nvPr>
-        </p:nvSpPr>
-        <p:spPr/>
-        <p:txBody>
-          <a:bodyPr/>
-          <a:lstStyle/>
-          <a:p>
-            <a:endParaRPr lang="en-US" dirty="0"/>
-          </a:p>
-        </p:txBody>
-      </p:sp>
-    </p:spTree>
-    <p:extLst>
-      <p:ext uri="{BB962C8B-B14F-4D97-AF65-F5344CB8AC3E}">
-        <p14:creationId xmlns:p14="http://schemas.microsoft.com/office/powerpoint/2010/main" val="1795927611"/>
-      </p:ext>
-    </p:extLst>
-  </p:cSld>
-  <p:clrMapOvr>
-    <a:masterClrMapping/>
-  </p:clrMapOvr>
-</p:sld>
-</file>
-
-<file path=ppt/slides/slide9.xml><?xml version="1.0" encoding="utf-8"?>
-<p:sld xmlns:a="http://schemas.openxmlformats.org/drawingml/2006/main" xmlns:r="http://schemas.openxmlformats.org/officeDocument/2006/relationships" xmlns:p="http://schemas.openxmlformats.org/presentationml/2006/main">
-  <p:cSld>
-    <p:spTree>
-      <p:nvGrpSpPr>
-        <p:cNvPr id="1" name=""/>
-        <p:cNvGrpSpPr/>
-        <p:nvPr/>
-      </p:nvGrpSpPr>
-      <p:grpSpPr>
-        <a:xfrm>
-          <a:off x="0" y="0"/>
-          <a:ext cx="0" cy="0"/>
-          <a:chOff x="0" y="0"/>
-          <a:chExt cx="0" cy="0"/>
-        </a:xfrm>
-      </p:grpSpPr>
-      <p:sp>
-        <p:nvSpPr>
-          <p:cNvPr id="2" name="Title 1"/>
-          <p:cNvSpPr>
-            <a:spLocks noGrp="1"/>
-          </p:cNvSpPr>
-          <p:nvPr>
-            <p:ph type="ctrTitle"/>
-          </p:nvPr>
-        </p:nvSpPr>
-        <p:spPr>
-          <a:xfrm>
-            <a:off x="924791" y="1572490"/>
-            <a:ext cx="7294418" cy="1156855"/>
-          </a:xfrm>
-        </p:spPr>
-        <p:txBody>
-          <a:bodyPr>
-            <a:normAutofit/>
-          </a:bodyPr>
-          <a:lstStyle/>
-          <a:p>
-            <a:endParaRPr lang="en-US" sz="4800" dirty="0">
-              <a:latin typeface="Futura Medium" panose="020B0602020204020303" pitchFamily="34" charset="-79"/>
-              <a:cs typeface="Futura Medium" panose="020B0602020204020303" pitchFamily="34" charset="-79"/>
-            </a:endParaRPr>
-          </a:p>
-        </p:txBody>
-      </p:sp>
-      <p:sp>
-        <p:nvSpPr>
-          <p:cNvPr id="3" name="Subtitle 2"/>
-          <p:cNvSpPr>
-            <a:spLocks noGrp="1"/>
-          </p:cNvSpPr>
-          <p:nvPr>
-            <p:ph type="subTitle" idx="1"/>
-          </p:nvPr>
-        </p:nvSpPr>
-        <p:spPr/>
-        <p:txBody>
-          <a:bodyPr/>
-          <a:lstStyle/>
-          <a:p>
-            <a:endParaRPr lang="en-US" dirty="0"/>
-          </a:p>
-        </p:txBody>
-      </p:sp>
-    </p:spTree>
-    <p:extLst>
-      <p:ext uri="{BB962C8B-B14F-4D97-AF65-F5344CB8AC3E}">
-        <p14:creationId xmlns:p14="http://schemas.microsoft.com/office/powerpoint/2010/main" val="832721319"/>
-      </p:ext>
-    </p:extLst>
-  </p:cSld>
-  <p:clrMapOvr>
-    <a:masterClrMapping/>
-  </p:clrMapOvr>
+  <p:timing>
+    <p:tnLst>
+      <p:par>
+        <p:cTn id="1" dur="indefinite" restart="never" nodeType="tmRoot">
+          <p:childTnLst>
+            <p:seq concurrent="1" nextAc="seek">
+              <p:cTn id="2" dur="indefinite" nodeType="mainSeq">
+                <p:childTnLst>
+                  <p:par>
+                    <p:cTn id="3" fill="hold">
+                      <p:stCondLst>
+                        <p:cond delay="indefinite"/>
+                      </p:stCondLst>
+                      <p:childTnLst>
+                        <p:par>
+                          <p:cTn id="4" fill="hold">
+                            <p:stCondLst>
+                              <p:cond delay="0"/>
+                            </p:stCondLst>
+                            <p:childTnLst>
+                              <p:par>
+                                <p:cTn id="5" presetID="10" presetClass="entr" presetSubtype="0" fill="hold" nodeType="clickEffect">
+                                  <p:stCondLst>
+                                    <p:cond delay="0"/>
+                                  </p:stCondLst>
+                                  <p:childTnLst>
+                                    <p:set>
+                                      <p:cBhvr>
+                                        <p:cTn id="6" dur="1" fill="hold">
+                                          <p:stCondLst>
+                                            <p:cond delay="0"/>
+                                          </p:stCondLst>
+                                        </p:cTn>
+                                        <p:tgtEl>
+                                          <p:spTgt spid="3">
+                                            <p:txEl>
+                                              <p:pRg st="0" end="0"/>
+                                            </p:txEl>
+                                          </p:spTgt>
+                                        </p:tgtEl>
+                                        <p:attrNameLst>
+                                          <p:attrName>style.visibility</p:attrName>
+                                        </p:attrNameLst>
+                                      </p:cBhvr>
+                                      <p:to>
+                                        <p:strVal val="visible"/>
+                                      </p:to>
+                                    </p:set>
+                                    <p:animEffect transition="in" filter="fade">
+                                      <p:cBhvr>
+                                        <p:cTn id="7" dur="500"/>
+                                        <p:tgtEl>
+                                          <p:spTgt spid="3">
+                                            <p:txEl>
+                                              <p:pRg st="0" end="0"/>
+                                            </p:txEl>
+                                          </p:spTgt>
+                                        </p:tgtEl>
+                                      </p:cBhvr>
+                                    </p:animEffect>
+                                  </p:childTnLst>
+                                </p:cTn>
+                              </p:par>
+                              <p:par>
+                                <p:cTn id="8" presetID="10" presetClass="entr" presetSubtype="0" fill="hold" nodeType="withEffect">
+                                  <p:stCondLst>
+                                    <p:cond delay="0"/>
+                                  </p:stCondLst>
+                                  <p:childTnLst>
+                                    <p:set>
+                                      <p:cBhvr>
+                                        <p:cTn id="9" dur="1" fill="hold">
+                                          <p:stCondLst>
+                                            <p:cond delay="0"/>
+                                          </p:stCondLst>
+                                        </p:cTn>
+                                        <p:tgtEl>
+                                          <p:spTgt spid="3">
+                                            <p:txEl>
+                                              <p:pRg st="1" end="1"/>
+                                            </p:txEl>
+                                          </p:spTgt>
+                                        </p:tgtEl>
+                                        <p:attrNameLst>
+                                          <p:attrName>style.visibility</p:attrName>
+                                        </p:attrNameLst>
+                                      </p:cBhvr>
+                                      <p:to>
+                                        <p:strVal val="visible"/>
+                                      </p:to>
+                                    </p:set>
+                                    <p:animEffect transition="in" filter="fade">
+                                      <p:cBhvr>
+                                        <p:cTn id="10" dur="500"/>
+                                        <p:tgtEl>
+                                          <p:spTgt spid="3">
+                                            <p:txEl>
+                                              <p:pRg st="1" end="1"/>
+                                            </p:txEl>
+                                          </p:spTgt>
+                                        </p:tgtEl>
+                                      </p:cBhvr>
+                                    </p:animEffect>
+                                  </p:childTnLst>
+                                </p:cTn>
+                              </p:par>
+                              <p:par>
+                                <p:cTn id="11" presetID="10" presetClass="entr" presetSubtype="0" fill="hold" nodeType="withEffect">
+                                  <p:stCondLst>
+                                    <p:cond delay="0"/>
+                                  </p:stCondLst>
+                                  <p:childTnLst>
+                                    <p:set>
+                                      <p:cBhvr>
+                                        <p:cTn id="12" dur="1" fill="hold">
+                                          <p:stCondLst>
+                                            <p:cond delay="0"/>
+                                          </p:stCondLst>
+                                        </p:cTn>
+                                        <p:tgtEl>
+                                          <p:spTgt spid="3">
+                                            <p:txEl>
+                                              <p:pRg st="2" end="2"/>
+                                            </p:txEl>
+                                          </p:spTgt>
+                                        </p:tgtEl>
+                                        <p:attrNameLst>
+                                          <p:attrName>style.visibility</p:attrName>
+                                        </p:attrNameLst>
+                                      </p:cBhvr>
+                                      <p:to>
+                                        <p:strVal val="visible"/>
+                                      </p:to>
+                                    </p:set>
+                                    <p:animEffect transition="in" filter="fade">
+                                      <p:cBhvr>
+                                        <p:cTn id="13" dur="500"/>
+                                        <p:tgtEl>
+                                          <p:spTgt spid="3">
+                                            <p:txEl>
+                                              <p:pRg st="2" end="2"/>
+                                            </p:txEl>
+                                          </p:spTgt>
+                                        </p:tgtEl>
+                                      </p:cBhvr>
+                                    </p:animEffect>
+                                  </p:childTnLst>
+                                </p:cTn>
+                              </p:par>
+                              <p:par>
+                                <p:cTn id="14" presetID="10" presetClass="entr" presetSubtype="0" fill="hold" nodeType="withEffect">
+                                  <p:stCondLst>
+                                    <p:cond delay="0"/>
+                                  </p:stCondLst>
+                                  <p:childTnLst>
+                                    <p:set>
+                                      <p:cBhvr>
+                                        <p:cTn id="15" dur="1" fill="hold">
+                                          <p:stCondLst>
+                                            <p:cond delay="0"/>
+                                          </p:stCondLst>
+                                        </p:cTn>
+                                        <p:tgtEl>
+                                          <p:spTgt spid="3">
+                                            <p:txEl>
+                                              <p:pRg st="3" end="3"/>
+                                            </p:txEl>
+                                          </p:spTgt>
+                                        </p:tgtEl>
+                                        <p:attrNameLst>
+                                          <p:attrName>style.visibility</p:attrName>
+                                        </p:attrNameLst>
+                                      </p:cBhvr>
+                                      <p:to>
+                                        <p:strVal val="visible"/>
+                                      </p:to>
+                                    </p:set>
+                                    <p:animEffect transition="in" filter="fade">
+                                      <p:cBhvr>
+                                        <p:cTn id="16" dur="500"/>
+                                        <p:tgtEl>
+                                          <p:spTgt spid="3">
+                                            <p:txEl>
+                                              <p:pRg st="3" end="3"/>
+                                            </p:txEl>
+                                          </p:spTgt>
+                                        </p:tgtEl>
+                                      </p:cBhvr>
+                                    </p:animEffect>
+                                  </p:childTnLst>
+                                </p:cTn>
+                              </p:par>
+                            </p:childTnLst>
+                          </p:cTn>
+                        </p:par>
+                      </p:childTnLst>
+                    </p:cTn>
+                  </p:par>
+                </p:childTnLst>
+              </p:cTn>
+              <p:prevCondLst>
+                <p:cond evt="onPrev" delay="0">
+                  <p:tgtEl>
+                    <p:sldTgt/>
+                  </p:tgtEl>
+                </p:cond>
+              </p:prevCondLst>
+              <p:nextCondLst>
+                <p:cond evt="onNext" delay="0">
+                  <p:tgtEl>
+                    <p:sldTgt/>
+                  </p:tgtEl>
+                </p:cond>
+              </p:nextCondLst>
+            </p:seq>
+          </p:childTnLst>
+        </p:cTn>
+      </p:par>
+    </p:tnLst>
+  </p:timing>
 </p:sld>
 </file>
 

</xml_diff>

<commit_message>
updated dropdown menu and content boxes css style
</commit_message>
<xml_diff>
--- a/presentation.pptx
+++ b/presentation.pptx
@@ -1930,7 +1930,7 @@
             <a:fld id="{E30E2307-1E40-4E12-8716-25BFDA8E7013}" type="datetime1">
               <a:rPr lang="en-US" smtClean="0"/>
               <a:pPr/>
-              <a:t>6/30/18</a:t>
+              <a:t>7/1/18</a:t>
             </a:fld>
             <a:endParaRPr lang="en-US"/>
           </a:p>
@@ -2111,7 +2111,7 @@
             <a:fld id="{E5CFCF5A-EA79-452C-A52C-1A2668C2E7DF}" type="datetime1">
               <a:rPr lang="en-US" smtClean="0"/>
               <a:pPr/>
-              <a:t>6/30/18</a:t>
+              <a:t>7/1/18</a:t>
             </a:fld>
             <a:endParaRPr lang="en-US"/>
           </a:p>
@@ -2264,7 +2264,7 @@
             <a:fld id="{2E5C4C28-BD4B-4892-9A2D-6E19BD753A9A}" type="datetime1">
               <a:rPr lang="en-US" smtClean="0"/>
               <a:pPr/>
-              <a:t>6/30/18</a:t>
+              <a:t>7/1/18</a:t>
             </a:fld>
             <a:endParaRPr lang="en-US"/>
           </a:p>
@@ -4091,7 +4091,7 @@
             <a:fld id="{61FD9D02-426E-46C9-9EE9-0DE1EF8B2838}" type="datetime1">
               <a:rPr lang="en-US" smtClean="0"/>
               <a:pPr/>
-              <a:t>6/30/18</a:t>
+              <a:t>7/1/18</a:t>
             </a:fld>
             <a:endParaRPr lang="en-US"/>
           </a:p>
@@ -5962,7 +5962,7 @@
             <a:fld id="{7B8AEBBE-F8B2-42CF-9895-E86A608384EB}" type="datetime1">
               <a:rPr lang="en-US" smtClean="0"/>
               <a:pPr/>
-              <a:t>6/30/18</a:t>
+              <a:t>7/1/18</a:t>
             </a:fld>
             <a:endParaRPr lang="en-US"/>
           </a:p>
@@ -6076,7 +6076,7 @@
             <a:fld id="{E1FAA6B6-10E5-4810-BC9F-DA72D8452E73}" type="datetime1">
               <a:rPr lang="en-US" smtClean="0"/>
               <a:pPr/>
-              <a:t>6/30/18</a:t>
+              <a:t>7/1/18</a:t>
             </a:fld>
             <a:endParaRPr lang="en-US"/>
           </a:p>
@@ -6616,7 +6616,7 @@
             <a:fld id="{6D18D072-EF12-4AA2-BD71-ABC68B06D0E2}" type="datetime1">
               <a:rPr lang="en-US" smtClean="0"/>
               <a:pPr/>
-              <a:t>6/30/18</a:t>
+              <a:t>7/1/18</a:t>
             </a:fld>
             <a:endParaRPr lang="en-US"/>
           </a:p>
@@ -6730,7 +6730,7 @@
             <a:fld id="{B8CDBF60-6CC3-4B74-A60D-3486985E4346}" type="datetime1">
               <a:rPr lang="en-US" smtClean="0"/>
               <a:pPr/>
-              <a:t>6/30/18</a:t>
+              <a:t>7/1/18</a:t>
             </a:fld>
             <a:endParaRPr lang="en-US"/>
           </a:p>
@@ -8443,7 +8443,7 @@
             <a:fld id="{22714818-984F-4759-BF72-A33BDC1963BD}" type="datetime1">
               <a:rPr lang="en-US" smtClean="0"/>
               <a:pPr/>
-              <a:t>6/30/18</a:t>
+              <a:t>7/1/18</a:t>
             </a:fld>
             <a:endParaRPr lang="en-US"/>
           </a:p>
@@ -8596,7 +8596,7 @@
             <a:fld id="{9EA7E191-5F94-4FC1-B823-BD7CABF7FA06}" type="datetime1">
               <a:rPr lang="en-US" smtClean="0"/>
               <a:pPr/>
-              <a:t>6/30/18</a:t>
+              <a:t>7/1/18</a:t>
             </a:fld>
             <a:endParaRPr lang="en-US"/>
           </a:p>
@@ -12213,7 +12213,7 @@
             <a:fld id="{88856D55-EFBE-4F9B-8A5F-09D42CA22A9B}" type="datetime1">
               <a:rPr lang="en-US" smtClean="0"/>
               <a:pPr/>
-              <a:t>6/30/18</a:t>
+              <a:t>7/1/18</a:t>
             </a:fld>
             <a:endParaRPr lang="en-US"/>
           </a:p>
@@ -14074,7 +14074,7 @@
             <a:fld id="{9D1D110F-3F4E-48D9-B8AA-5D0E825AFDBA}" type="datetime1">
               <a:rPr lang="en-US" smtClean="0"/>
               <a:pPr/>
-              <a:t>6/30/18</a:t>
+              <a:t>7/1/18</a:t>
             </a:fld>
             <a:endParaRPr lang="en-US"/>
           </a:p>
@@ -14711,140 +14711,6 @@
   <p:clrMapOvr>
     <a:masterClrMapping/>
   </p:clrMapOvr>
-  <p:timing>
-    <p:tnLst>
-      <p:par>
-        <p:cTn id="1" dur="indefinite" restart="never" nodeType="tmRoot">
-          <p:childTnLst>
-            <p:seq concurrent="1" nextAc="seek">
-              <p:cTn id="2" dur="indefinite" nodeType="mainSeq">
-                <p:childTnLst>
-                  <p:par>
-                    <p:cTn id="3" fill="hold">
-                      <p:stCondLst>
-                        <p:cond delay="indefinite"/>
-                      </p:stCondLst>
-                      <p:childTnLst>
-                        <p:par>
-                          <p:cTn id="4" fill="hold">
-                            <p:stCondLst>
-                              <p:cond delay="0"/>
-                            </p:stCondLst>
-                            <p:childTnLst>
-                              <p:par>
-                                <p:cTn id="5" presetID="10" presetClass="entr" presetSubtype="0" fill="hold" nodeType="clickEffect">
-                                  <p:stCondLst>
-                                    <p:cond delay="0"/>
-                                  </p:stCondLst>
-                                  <p:childTnLst>
-                                    <p:set>
-                                      <p:cBhvr>
-                                        <p:cTn id="6" dur="1" fill="hold">
-                                          <p:stCondLst>
-                                            <p:cond delay="0"/>
-                                          </p:stCondLst>
-                                        </p:cTn>
-                                        <p:tgtEl>
-                                          <p:spTgt spid="3">
-                                            <p:txEl>
-                                              <p:pRg st="0" end="0"/>
-                                            </p:txEl>
-                                          </p:spTgt>
-                                        </p:tgtEl>
-                                        <p:attrNameLst>
-                                          <p:attrName>style.visibility</p:attrName>
-                                        </p:attrNameLst>
-                                      </p:cBhvr>
-                                      <p:to>
-                                        <p:strVal val="visible"/>
-                                      </p:to>
-                                    </p:set>
-                                    <p:animEffect transition="in" filter="fade">
-                                      <p:cBhvr>
-                                        <p:cTn id="7" dur="500"/>
-                                        <p:tgtEl>
-                                          <p:spTgt spid="3">
-                                            <p:txEl>
-                                              <p:pRg st="0" end="0"/>
-                                            </p:txEl>
-                                          </p:spTgt>
-                                        </p:tgtEl>
-                                      </p:cBhvr>
-                                    </p:animEffect>
-                                  </p:childTnLst>
-                                </p:cTn>
-                              </p:par>
-                              <p:par>
-                                <p:cTn id="8" presetID="10" presetClass="entr" presetSubtype="0" fill="hold" nodeType="withEffect">
-                                  <p:stCondLst>
-                                    <p:cond delay="0"/>
-                                  </p:stCondLst>
-                                  <p:childTnLst>
-                                    <p:set>
-                                      <p:cBhvr>
-                                        <p:cTn id="9" dur="1" fill="hold">
-                                          <p:stCondLst>
-                                            <p:cond delay="0"/>
-                                          </p:stCondLst>
-                                        </p:cTn>
-                                        <p:tgtEl>
-                                          <p:spTgt spid="3">
-                                            <p:txEl>
-                                              <p:pRg st="1" end="1"/>
-                                            </p:txEl>
-                                          </p:spTgt>
-                                        </p:tgtEl>
-                                        <p:attrNameLst>
-                                          <p:attrName>style.visibility</p:attrName>
-                                        </p:attrNameLst>
-                                      </p:cBhvr>
-                                      <p:to>
-                                        <p:strVal val="visible"/>
-                                      </p:to>
-                                    </p:set>
-                                    <p:animEffect transition="in" filter="fade">
-                                      <p:cBhvr>
-                                        <p:cTn id="10" dur="500"/>
-                                        <p:tgtEl>
-                                          <p:spTgt spid="3">
-                                            <p:txEl>
-                                              <p:pRg st="1" end="1"/>
-                                            </p:txEl>
-                                          </p:spTgt>
-                                        </p:tgtEl>
-                                      </p:cBhvr>
-                                    </p:animEffect>
-                                  </p:childTnLst>
-                                </p:cTn>
-                              </p:par>
-                            </p:childTnLst>
-                          </p:cTn>
-                        </p:par>
-                      </p:childTnLst>
-                    </p:cTn>
-                  </p:par>
-                </p:childTnLst>
-              </p:cTn>
-              <p:prevCondLst>
-                <p:cond evt="onPrev" delay="0">
-                  <p:tgtEl>
-                    <p:sldTgt/>
-                  </p:tgtEl>
-                </p:cond>
-              </p:prevCondLst>
-              <p:nextCondLst>
-                <p:cond evt="onNext" delay="0">
-                  <p:tgtEl>
-                    <p:sldTgt/>
-                  </p:tgtEl>
-                </p:cond>
-              </p:nextCondLst>
-            </p:seq>
-          </p:childTnLst>
-        </p:cTn>
-      </p:par>
-    </p:tnLst>
-  </p:timing>
 </p:sld>
 </file>
 
@@ -14877,7 +14743,7 @@
         </p:nvSpPr>
         <p:spPr>
           <a:xfrm>
-            <a:off x="1318319" y="781833"/>
+            <a:off x="1585949" y="751629"/>
             <a:ext cx="7172074" cy="958647"/>
           </a:xfrm>
         </p:spPr>
@@ -14962,7 +14828,7 @@
         </p:blipFill>
         <p:spPr>
           <a:xfrm>
-            <a:off x="282512" y="781833"/>
+            <a:off x="556223" y="751629"/>
             <a:ext cx="1436400" cy="1436400"/>
           </a:xfrm>
           <a:prstGeom prst="rect">
@@ -15576,7 +15442,7 @@
         </p:blipFill>
         <p:spPr>
           <a:xfrm>
-            <a:off x="715295" y="558274"/>
+            <a:off x="860261" y="558274"/>
             <a:ext cx="1436400" cy="1436400"/>
           </a:xfrm>
           <a:prstGeom prst="rect">
@@ -16100,7 +15966,7 @@
         </p:blipFill>
         <p:spPr>
           <a:xfrm>
-            <a:off x="715295" y="663845"/>
+            <a:off x="904866" y="628111"/>
             <a:ext cx="1436400" cy="1436400"/>
           </a:xfrm>
           <a:prstGeom prst="rect">
@@ -16492,7 +16358,26 @@
                 <a:latin typeface="Futura Medium" panose="020B0602020204020303" pitchFamily="34" charset="-79"/>
                 <a:cs typeface="Futura Medium" panose="020B0602020204020303" pitchFamily="34" charset="-79"/>
               </a:rPr>
-              <a:t>Adding filters to search bar (distance from event, type of event, etc.)</a:t>
+              <a:t>Adding filters to search bar (distance</a:t>
+            </a:r>
+          </a:p>
+          <a:p>
+            <a:pPr>
+              <a:lnSpc>
+                <a:spcPts val="4640"/>
+              </a:lnSpc>
+              <a:buClr>
+                <a:schemeClr val="bg1">
+                  <a:lumMod val="95000"/>
+                </a:schemeClr>
+              </a:buClr>
+            </a:pPr>
+            <a:r>
+              <a:rPr lang="en-US" sz="2800" dirty="0">
+                <a:latin typeface="Futura Medium" panose="020B0602020204020303" pitchFamily="34" charset="-79"/>
+                <a:cs typeface="Futura Medium" panose="020B0602020204020303" pitchFamily="34" charset="-79"/>
+              </a:rPr>
+              <a:t>from the event, type of event, etc.)</a:t>
             </a:r>
           </a:p>
         </p:txBody>
@@ -16525,7 +16410,7 @@
         </p:blipFill>
         <p:spPr>
           <a:xfrm>
-            <a:off x="535680" y="628111"/>
+            <a:off x="747554" y="628111"/>
             <a:ext cx="1436400" cy="1436400"/>
           </a:xfrm>
           <a:prstGeom prst="rect">
@@ -16727,6 +16612,49 @@
                                           <p:spTgt spid="3">
                                             <p:txEl>
                                               <p:pRg st="3" end="3"/>
+                                            </p:txEl>
+                                          </p:spTgt>
+                                        </p:tgtEl>
+                                      </p:cBhvr>
+                                    </p:animEffect>
+                                  </p:childTnLst>
+                                </p:cTn>
+                              </p:par>
+                              <p:par>
+                                <p:cTn id="17" presetID="10" presetClass="entr" presetSubtype="0" fill="hold" nodeType="withEffect">
+                                  <p:stCondLst>
+                                    <p:cond delay="0"/>
+                                  </p:stCondLst>
+                                  <p:childTnLst>
+                                    <p:set>
+                                      <p:cBhvr>
+                                        <p:cTn id="18" dur="1" fill="hold">
+                                          <p:stCondLst>
+                                            <p:cond delay="0"/>
+                                          </p:stCondLst>
+                                        </p:cTn>
+                                        <p:tgtEl>
+                                          <p:spTgt spid="3">
+                                            <p:txEl>
+                                              <p:pRg st="4" end="4"/>
+                                            </p:txEl>
+                                          </p:spTgt>
+                                        </p:tgtEl>
+                                        <p:attrNameLst>
+                                          <p:attrName>style.visibility</p:attrName>
+                                        </p:attrNameLst>
+                                      </p:cBhvr>
+                                      <p:to>
+                                        <p:strVal val="visible"/>
+                                      </p:to>
+                                    </p:set>
+                                    <p:animEffect transition="in" filter="fade">
+                                      <p:cBhvr>
+                                        <p:cTn id="19" dur="500"/>
+                                        <p:tgtEl>
+                                          <p:spTgt spid="3">
+                                            <p:txEl>
+                                              <p:pRg st="4" end="4"/>
                                             </p:txEl>
                                           </p:spTgt>
                                         </p:tgtEl>

</xml_diff>

<commit_message>
fixed background of index.html and adjusted PowerPoint
</commit_message>
<xml_diff>
--- a/presentation.pptx
+++ b/presentation.pptx
@@ -15394,8 +15394,8 @@
         </p:nvSpPr>
         <p:spPr>
           <a:xfrm>
-            <a:off x="6498241" y="1983511"/>
-            <a:ext cx="1436400" cy="504950"/>
+            <a:off x="6498240" y="2075121"/>
+            <a:ext cx="1436400" cy="486635"/>
           </a:xfrm>
         </p:spPr>
         <p:txBody>
@@ -15464,7 +15464,7 @@
         </p:nvSpPr>
         <p:spPr>
           <a:xfrm>
-            <a:off x="2151695" y="2077190"/>
+            <a:off x="2296661" y="2075121"/>
             <a:ext cx="1562094" cy="461665"/>
           </a:xfrm>
           <a:prstGeom prst="rect">
@@ -15492,10 +15492,10 @@
       </p:sp>
       <p:pic>
         <p:nvPicPr>
-          <p:cNvPr id="6" name="Picture 5">
+          <p:cNvPr id="7" name="Picture 6">
             <a:extLst>
               <a:ext uri="{FF2B5EF4-FFF2-40B4-BE49-F238E27FC236}">
-                <a16:creationId xmlns:a16="http://schemas.microsoft.com/office/drawing/2014/main" id="{BCEAB70B-8F2C-3A46-B79A-DE4BDD136032}"/>
+                <a16:creationId xmlns:a16="http://schemas.microsoft.com/office/drawing/2014/main" id="{88534209-8F50-884B-BFBB-BE4AD1222375}"/>
               </a:ext>
             </a:extLst>
           </p:cNvPr>
@@ -15518,8 +15518,8 @@
         </p:blipFill>
         <p:spPr>
           <a:xfrm>
-            <a:off x="435306" y="2621371"/>
-            <a:ext cx="4994872" cy="3111788"/>
+            <a:off x="484615" y="2617233"/>
+            <a:ext cx="4896253" cy="3044356"/>
           </a:xfrm>
           <a:prstGeom prst="roundRect">
             <a:avLst>
@@ -15554,10 +15554,10 @@
       </p:pic>
       <p:pic>
         <p:nvPicPr>
-          <p:cNvPr id="9" name="Picture 8">
+          <p:cNvPr id="10" name="Picture 9">
             <a:extLst>
               <a:ext uri="{FF2B5EF4-FFF2-40B4-BE49-F238E27FC236}">
-                <a16:creationId xmlns:a16="http://schemas.microsoft.com/office/drawing/2014/main" id="{CD030A94-F598-6E46-AFA6-949A559A01D7}"/>
+                <a16:creationId xmlns:a16="http://schemas.microsoft.com/office/drawing/2014/main" id="{8FD69BDE-03EB-D445-82D5-80CEA3BD1C12}"/>
               </a:ext>
             </a:extLst>
           </p:cNvPr>
@@ -15580,8 +15580,8 @@
         </p:blipFill>
         <p:spPr>
           <a:xfrm>
-            <a:off x="5799377" y="2488461"/>
-            <a:ext cx="2834128" cy="3226423"/>
+            <a:off x="5865252" y="2617233"/>
+            <a:ext cx="2702377" cy="3044356"/>
           </a:xfrm>
           <a:prstGeom prst="roundRect">
             <a:avLst>
@@ -15654,7 +15654,7 @@
                                       <p:cBhvr>
                                         <p:cTn id="6" dur="500" tmFilter="0, 0; .2, .5; .8, .5; 1, 0"/>
                                         <p:tgtEl>
-                                          <p:spTgt spid="6"/>
+                                          <p:spTgt spid="7"/>
                                         </p:tgtEl>
                                       </p:cBhvr>
                                     </p:animEffect>
@@ -15662,7 +15662,7 @@
                                       <p:cBhvr>
                                         <p:cTn id="7" dur="250" autoRev="1" fill="hold"/>
                                         <p:tgtEl>
-                                          <p:spTgt spid="6"/>
+                                          <p:spTgt spid="7"/>
                                         </p:tgtEl>
                                       </p:cBhvr>
                                       <p:by x="105000" y="105000"/>
@@ -15698,7 +15698,7 @@
                                       <p:cBhvr>
                                         <p:cTn id="11" dur="500" tmFilter="0, 0; .2, .5; .8, .5; 1, 0"/>
                                         <p:tgtEl>
-                                          <p:spTgt spid="9"/>
+                                          <p:spTgt spid="10"/>
                                         </p:tgtEl>
                                       </p:cBhvr>
                                     </p:animEffect>
@@ -15706,7 +15706,7 @@
                                       <p:cBhvr>
                                         <p:cTn id="12" dur="250" autoRev="1" fill="hold"/>
                                         <p:tgtEl>
-                                          <p:spTgt spid="9"/>
+                                          <p:spTgt spid="10"/>
                                         </p:tgtEl>
                                       </p:cBhvr>
                                       <p:by x="105000" y="105000"/>
@@ -16236,7 +16236,7 @@
         </p:nvSpPr>
         <p:spPr>
           <a:xfrm>
-            <a:off x="1845129" y="793330"/>
+            <a:off x="1845129" y="609335"/>
             <a:ext cx="6665742" cy="835660"/>
           </a:xfrm>
         </p:spPr>
@@ -16268,7 +16268,7 @@
         </p:nvSpPr>
         <p:spPr>
           <a:xfrm>
-            <a:off x="287634" y="2064511"/>
+            <a:off x="321088" y="1594824"/>
             <a:ext cx="8490857" cy="3617832"/>
           </a:xfrm>
         </p:spPr>
@@ -16280,7 +16280,7 @@
           <a:p>
             <a:pPr marL="571500" indent="-571500">
               <a:lnSpc>
-                <a:spcPts val="4640"/>
+                <a:spcPct val="150000"/>
               </a:lnSpc>
               <a:buClr>
                 <a:schemeClr val="bg1">
@@ -16291,7 +16291,7 @@
               <a:buChar char="•"/>
             </a:pPr>
             <a:r>
-              <a:rPr lang="en-US" sz="2800" dirty="0">
+              <a:rPr lang="en-US" sz="2400" dirty="0">
                 <a:latin typeface="Futura Medium" panose="020B0602020204020303" pitchFamily="34" charset="-79"/>
                 <a:cs typeface="Futura Medium" panose="020B0602020204020303" pitchFamily="34" charset="-79"/>
               </a:rPr>
@@ -16301,7 +16301,7 @@
           <a:p>
             <a:pPr marL="571500" indent="-571500">
               <a:lnSpc>
-                <a:spcPts val="4640"/>
+                <a:spcPct val="150000"/>
               </a:lnSpc>
               <a:buClr>
                 <a:schemeClr val="bg1">
@@ -16312,7 +16312,7 @@
               <a:buChar char="•"/>
             </a:pPr>
             <a:r>
-              <a:rPr lang="en-US" sz="2800" dirty="0">
+              <a:rPr lang="en-US" sz="2400" dirty="0">
                 <a:latin typeface="Futura Medium" panose="020B0602020204020303" pitchFamily="34" charset="-79"/>
                 <a:cs typeface="Futura Medium" panose="020B0602020204020303" pitchFamily="34" charset="-79"/>
               </a:rPr>
@@ -16322,7 +16322,7 @@
           <a:p>
             <a:pPr marL="571500" indent="-571500">
               <a:lnSpc>
-                <a:spcPts val="4640"/>
+                <a:spcPct val="150000"/>
               </a:lnSpc>
               <a:buClr>
                 <a:schemeClr val="bg1">
@@ -16333,7 +16333,7 @@
               <a:buChar char="•"/>
             </a:pPr>
             <a:r>
-              <a:rPr lang="en-US" sz="2800" dirty="0">
+              <a:rPr lang="en-US" sz="2400" dirty="0">
                 <a:latin typeface="Futura Medium" panose="020B0602020204020303" pitchFamily="34" charset="-79"/>
                 <a:cs typeface="Futura Medium" panose="020B0602020204020303" pitchFamily="34" charset="-79"/>
               </a:rPr>
@@ -16343,7 +16343,7 @@
           <a:p>
             <a:pPr marL="571500" indent="-571500">
               <a:lnSpc>
-                <a:spcPts val="4640"/>
+                <a:spcPct val="150000"/>
               </a:lnSpc>
               <a:buClr>
                 <a:schemeClr val="bg1">
@@ -16354,7 +16354,7 @@
               <a:buChar char="•"/>
             </a:pPr>
             <a:r>
-              <a:rPr lang="en-US" sz="2800" dirty="0">
+              <a:rPr lang="en-US" sz="2400" dirty="0">
                 <a:latin typeface="Futura Medium" panose="020B0602020204020303" pitchFamily="34" charset="-79"/>
                 <a:cs typeface="Futura Medium" panose="020B0602020204020303" pitchFamily="34" charset="-79"/>
               </a:rPr>
@@ -16364,7 +16364,7 @@
           <a:p>
             <a:pPr>
               <a:lnSpc>
-                <a:spcPts val="4640"/>
+                <a:spcPct val="150000"/>
               </a:lnSpc>
               <a:buClr>
                 <a:schemeClr val="bg1">
@@ -16373,11 +16373,32 @@
               </a:buClr>
             </a:pPr>
             <a:r>
-              <a:rPr lang="en-US" sz="2800" dirty="0">
+              <a:rPr lang="en-US" sz="2400" dirty="0">
                 <a:latin typeface="Futura Medium" panose="020B0602020204020303" pitchFamily="34" charset="-79"/>
                 <a:cs typeface="Futura Medium" panose="020B0602020204020303" pitchFamily="34" charset="-79"/>
               </a:rPr>
               <a:t>from the event, type of event, etc.)</a:t>
+            </a:r>
+          </a:p>
+          <a:p>
+            <a:pPr marL="342900" indent="-342900">
+              <a:lnSpc>
+                <a:spcPct val="150000"/>
+              </a:lnSpc>
+              <a:buClr>
+                <a:schemeClr val="bg1">
+                  <a:lumMod val="95000"/>
+                </a:schemeClr>
+              </a:buClr>
+              <a:buFont typeface="Arial" panose="020B0604020202020204" pitchFamily="34" charset="0"/>
+              <a:buChar char="•"/>
+            </a:pPr>
+            <a:r>
+              <a:rPr lang="en-US" sz="2400" dirty="0">
+                <a:latin typeface="Futura Medium" panose="020B0602020204020303" pitchFamily="34" charset="-79"/>
+                <a:cs typeface="Futura Medium" panose="020B0602020204020303" pitchFamily="34" charset="-79"/>
+              </a:rPr>
+              <a:t>Interactive backgrounds (snow, rain, etc.)</a:t>
             </a:r>
           </a:p>
         </p:txBody>
@@ -16410,7 +16431,7 @@
         </p:blipFill>
         <p:spPr>
           <a:xfrm>
-            <a:off x="747554" y="628111"/>
+            <a:off x="747554" y="459506"/>
             <a:ext cx="1436400" cy="1436400"/>
           </a:xfrm>
           <a:prstGeom prst="rect">
@@ -16655,6 +16676,49 @@
                                           <p:spTgt spid="3">
                                             <p:txEl>
                                               <p:pRg st="4" end="4"/>
+                                            </p:txEl>
+                                          </p:spTgt>
+                                        </p:tgtEl>
+                                      </p:cBhvr>
+                                    </p:animEffect>
+                                  </p:childTnLst>
+                                </p:cTn>
+                              </p:par>
+                              <p:par>
+                                <p:cTn id="20" presetID="10" presetClass="entr" presetSubtype="0" fill="hold" nodeType="withEffect">
+                                  <p:stCondLst>
+                                    <p:cond delay="0"/>
+                                  </p:stCondLst>
+                                  <p:childTnLst>
+                                    <p:set>
+                                      <p:cBhvr>
+                                        <p:cTn id="21" dur="1" fill="hold">
+                                          <p:stCondLst>
+                                            <p:cond delay="0"/>
+                                          </p:stCondLst>
+                                        </p:cTn>
+                                        <p:tgtEl>
+                                          <p:spTgt spid="3">
+                                            <p:txEl>
+                                              <p:pRg st="5" end="5"/>
+                                            </p:txEl>
+                                          </p:spTgt>
+                                        </p:tgtEl>
+                                        <p:attrNameLst>
+                                          <p:attrName>style.visibility</p:attrName>
+                                        </p:attrNameLst>
+                                      </p:cBhvr>
+                                      <p:to>
+                                        <p:strVal val="visible"/>
+                                      </p:to>
+                                    </p:set>
+                                    <p:animEffect transition="in" filter="fade">
+                                      <p:cBhvr>
+                                        <p:cTn id="22" dur="500"/>
+                                        <p:tgtEl>
+                                          <p:spTgt spid="3">
+                                            <p:txEl>
+                                              <p:pRg st="5" end="5"/>
                                             </p:txEl>
                                           </p:spTgt>
                                         </p:tgtEl>

</xml_diff>